<commit_message>
Rouch draft website ready
</commit_message>
<xml_diff>
--- a/planning_docs/site-mock-up-v1.pptx
+++ b/planning_docs/site-mock-up-v1.pptx
@@ -113,6 +113,11 @@
       </a:defRPr>
     </a:lvl9pPr>
   </p:defaultTextStyle>
+  <p:extLst>
+    <p:ext uri="{EFAFB233-063F-42B5-8137-9DF3F51BA10A}">
+      <p15:sldGuideLst xmlns:p15="http://schemas.microsoft.com/office/powerpoint/2012/main"/>
+    </p:ext>
+  </p:extLst>
 </p:presentation>
 </file>
 
@@ -198,7 +203,7 @@
           <a:p>
             <a:fld id="{3C9D58D5-F324-F849-8B4C-27C4F43A2679}" type="datetimeFigureOut">
               <a:rPr lang="en-US" smtClean="0"/>
-              <a:t>8/19/21</a:t>
+              <a:t>8/20/21</a:t>
             </a:fld>
             <a:endParaRPr lang="en-US"/>
           </a:p>
@@ -1184,7 +1189,7 @@
           <a:p>
             <a:fld id="{C2A94B31-431E-3A46-BCA7-D3ED30BCC188}" type="datetimeFigureOut">
               <a:rPr lang="en-US" smtClean="0"/>
-              <a:t>8/18/21</a:t>
+              <a:t>8/20/21</a:t>
             </a:fld>
             <a:endParaRPr lang="en-US"/>
           </a:p>
@@ -1354,7 +1359,7 @@
           <a:p>
             <a:fld id="{C2A94B31-431E-3A46-BCA7-D3ED30BCC188}" type="datetimeFigureOut">
               <a:rPr lang="en-US" smtClean="0"/>
-              <a:t>8/18/21</a:t>
+              <a:t>8/20/21</a:t>
             </a:fld>
             <a:endParaRPr lang="en-US"/>
           </a:p>
@@ -1534,7 +1539,7 @@
           <a:p>
             <a:fld id="{C2A94B31-431E-3A46-BCA7-D3ED30BCC188}" type="datetimeFigureOut">
               <a:rPr lang="en-US" smtClean="0"/>
-              <a:t>8/18/21</a:t>
+              <a:t>8/20/21</a:t>
             </a:fld>
             <a:endParaRPr lang="en-US"/>
           </a:p>
@@ -1704,7 +1709,7 @@
           <a:p>
             <a:fld id="{C2A94B31-431E-3A46-BCA7-D3ED30BCC188}" type="datetimeFigureOut">
               <a:rPr lang="en-US" smtClean="0"/>
-              <a:t>8/18/21</a:t>
+              <a:t>8/20/21</a:t>
             </a:fld>
             <a:endParaRPr lang="en-US"/>
           </a:p>
@@ -1948,7 +1953,7 @@
           <a:p>
             <a:fld id="{C2A94B31-431E-3A46-BCA7-D3ED30BCC188}" type="datetimeFigureOut">
               <a:rPr lang="en-US" smtClean="0"/>
-              <a:t>8/18/21</a:t>
+              <a:t>8/20/21</a:t>
             </a:fld>
             <a:endParaRPr lang="en-US"/>
           </a:p>
@@ -2180,7 +2185,7 @@
           <a:p>
             <a:fld id="{C2A94B31-431E-3A46-BCA7-D3ED30BCC188}" type="datetimeFigureOut">
               <a:rPr lang="en-US" smtClean="0"/>
-              <a:t>8/18/21</a:t>
+              <a:t>8/20/21</a:t>
             </a:fld>
             <a:endParaRPr lang="en-US"/>
           </a:p>
@@ -2547,7 +2552,7 @@
           <a:p>
             <a:fld id="{C2A94B31-431E-3A46-BCA7-D3ED30BCC188}" type="datetimeFigureOut">
               <a:rPr lang="en-US" smtClean="0"/>
-              <a:t>8/18/21</a:t>
+              <a:t>8/20/21</a:t>
             </a:fld>
             <a:endParaRPr lang="en-US"/>
           </a:p>
@@ -2665,7 +2670,7 @@
           <a:p>
             <a:fld id="{C2A94B31-431E-3A46-BCA7-D3ED30BCC188}" type="datetimeFigureOut">
               <a:rPr lang="en-US" smtClean="0"/>
-              <a:t>8/18/21</a:t>
+              <a:t>8/20/21</a:t>
             </a:fld>
             <a:endParaRPr lang="en-US"/>
           </a:p>
@@ -2760,7 +2765,7 @@
           <a:p>
             <a:fld id="{C2A94B31-431E-3A46-BCA7-D3ED30BCC188}" type="datetimeFigureOut">
               <a:rPr lang="en-US" smtClean="0"/>
-              <a:t>8/18/21</a:t>
+              <a:t>8/20/21</a:t>
             </a:fld>
             <a:endParaRPr lang="en-US"/>
           </a:p>
@@ -3037,7 +3042,7 @@
           <a:p>
             <a:fld id="{C2A94B31-431E-3A46-BCA7-D3ED30BCC188}" type="datetimeFigureOut">
               <a:rPr lang="en-US" smtClean="0"/>
-              <a:t>8/18/21</a:t>
+              <a:t>8/20/21</a:t>
             </a:fld>
             <a:endParaRPr lang="en-US"/>
           </a:p>
@@ -3294,7 +3299,7 @@
           <a:p>
             <a:fld id="{C2A94B31-431E-3A46-BCA7-D3ED30BCC188}" type="datetimeFigureOut">
               <a:rPr lang="en-US" smtClean="0"/>
-              <a:t>8/18/21</a:t>
+              <a:t>8/20/21</a:t>
             </a:fld>
             <a:endParaRPr lang="en-US"/>
           </a:p>
@@ -3507,7 +3512,7 @@
           <a:p>
             <a:fld id="{C2A94B31-431E-3A46-BCA7-D3ED30BCC188}" type="datetimeFigureOut">
               <a:rPr lang="en-US" smtClean="0"/>
-              <a:t>8/18/21</a:t>
+              <a:t>8/20/21</a:t>
             </a:fld>
             <a:endParaRPr lang="en-US"/>
           </a:p>
@@ -5925,7 +5930,7 @@
         </p:nvSpPr>
         <p:spPr>
           <a:xfrm>
-            <a:off x="445168" y="3702019"/>
+            <a:off x="438484" y="3555954"/>
             <a:ext cx="3429000" cy="2031325"/>
           </a:xfrm>
           <a:prstGeom prst="rect">
@@ -6034,7 +6039,7 @@
         </p:nvSpPr>
         <p:spPr>
           <a:xfrm>
-            <a:off x="3537283" y="3426436"/>
+            <a:off x="3530599" y="3280371"/>
             <a:ext cx="3429000" cy="1754326"/>
           </a:xfrm>
           <a:prstGeom prst="rect">
@@ -6108,60 +6113,6 @@
               <a:t>10. Data point 10:</a:t>
             </a:r>
             <a:endParaRPr lang="en-US" dirty="0"/>
-          </a:p>
-        </p:txBody>
-      </p:sp>
-      <p:sp>
-        <p:nvSpPr>
-          <p:cNvPr id="6" name="Rectangle 5">
-            <a:extLst>
-              <a:ext uri="{FF2B5EF4-FFF2-40B4-BE49-F238E27FC236}">
-                <a16:creationId xmlns:a16="http://schemas.microsoft.com/office/drawing/2014/main" id="{A678DB2F-D068-D34B-941C-1D6FCD7536F4}"/>
-              </a:ext>
-            </a:extLst>
-          </p:cNvPr>
-          <p:cNvSpPr/>
-          <p:nvPr/>
-        </p:nvSpPr>
-        <p:spPr>
-          <a:xfrm>
-            <a:off x="4745558" y="8838419"/>
-            <a:ext cx="1980094" cy="369332"/>
-          </a:xfrm>
-          <a:prstGeom prst="rect">
-            <a:avLst/>
-          </a:prstGeom>
-        </p:spPr>
-        <p:txBody>
-          <a:bodyPr wrap="none">
-            <a:spAutoFit/>
-          </a:bodyPr>
-          <a:lstStyle/>
-          <a:p>
-            <a:r>
-              <a:rPr lang="en-US" dirty="0">
-                <a:solidFill>
-                  <a:srgbClr val="062EAB"/>
-                </a:solidFill>
-              </a:rPr>
-              <a:t>(</a:t>
-            </a:r>
-            <a:r>
-              <a:rPr lang="en-US" baseline="30000" dirty="0">
-                <a:solidFill>
-                  <a:srgbClr val="062EAB"/>
-                </a:solidFill>
-              </a:rPr>
-              <a:t>1 </a:t>
-            </a:r>
-            <a:r>
-              <a:rPr lang="en-US" dirty="0">
-                <a:solidFill>
-                  <a:srgbClr val="062EAB"/>
-                </a:solidFill>
-              </a:rPr>
-              <a:t>full citation here)</a:t>
-            </a:r>
           </a:p>
         </p:txBody>
       </p:sp>
@@ -6272,7 +6223,54 @@
                   <a:srgbClr val="062EAB"/>
                 </a:solidFill>
               </a:rPr>
-              <a:t>Results: </a:t>
+              <a:t>Results:</a:t>
+            </a:r>
+          </a:p>
+          <a:p>
+            <a:endParaRPr lang="en-US" b="1" dirty="0">
+              <a:solidFill>
+                <a:srgbClr val="062EAB"/>
+              </a:solidFill>
+            </a:endParaRPr>
+          </a:p>
+          <a:p>
+            <a:r>
+              <a:rPr lang="en-US" b="1" dirty="0">
+                <a:solidFill>
+                  <a:srgbClr val="062EAB"/>
+                </a:solidFill>
+              </a:rPr>
+              <a:t>Produce RED / GREEN icon depending on result, with a </a:t>
+            </a:r>
+            <a:r>
+              <a:rPr lang="en-US" b="1">
+                <a:solidFill>
+                  <a:srgbClr val="062EAB"/>
+                </a:solidFill>
+              </a:rPr>
+              <a:t>numeric percent</a:t>
+            </a:r>
+            <a:endParaRPr lang="en-US" b="1" dirty="0">
+              <a:solidFill>
+                <a:srgbClr val="062EAB"/>
+              </a:solidFill>
+            </a:endParaRPr>
+          </a:p>
+          <a:p>
+            <a:endParaRPr lang="en-US" b="1" dirty="0">
+              <a:solidFill>
+                <a:srgbClr val="062EAB"/>
+              </a:solidFill>
+            </a:endParaRPr>
+          </a:p>
+          <a:p>
+            <a:r>
+              <a:rPr lang="en-US" b="1" dirty="0">
+                <a:solidFill>
+                  <a:srgbClr val="062EAB"/>
+                </a:solidFill>
+              </a:rPr>
+              <a:t>Can it produce a dashboard? </a:t>
             </a:r>
             <a:endParaRPr lang="en-US" dirty="0">
               <a:solidFill>
@@ -6291,10 +6289,10 @@
       </p:sp>
       <p:sp>
         <p:nvSpPr>
-          <p:cNvPr id="31" name="Rectangle 30">
+          <p:cNvPr id="12" name="Rounded Rectangle 11">
             <a:extLst>
               <a:ext uri="{FF2B5EF4-FFF2-40B4-BE49-F238E27FC236}">
-                <a16:creationId xmlns:a16="http://schemas.microsoft.com/office/drawing/2014/main" id="{2FA44050-1266-AC41-AA6A-734B716263CC}"/>
+                <a16:creationId xmlns:a16="http://schemas.microsoft.com/office/drawing/2014/main" id="{DFBAC41B-3676-2E4B-9CC8-7162D2E58078}"/>
               </a:ext>
             </a:extLst>
           </p:cNvPr>
@@ -6303,16 +6301,16 @@
         </p:nvSpPr>
         <p:spPr>
           <a:xfrm>
-            <a:off x="0" y="9720951"/>
-            <a:ext cx="6858000" cy="513200"/>
-          </a:xfrm>
-          <a:prstGeom prst="rect">
+            <a:off x="275654" y="8212078"/>
+            <a:ext cx="1884014" cy="1773315"/>
+          </a:xfrm>
+          <a:prstGeom prst="roundRect">
             <a:avLst/>
           </a:prstGeom>
           <a:solidFill>
-            <a:schemeClr val="tx1">
-              <a:lumMod val="50000"/>
-              <a:lumOff val="50000"/>
+            <a:schemeClr val="accent1">
+              <a:lumMod val="20000"/>
+              <a:lumOff val="80000"/>
             </a:schemeClr>
           </a:solidFill>
         </p:spPr>
@@ -6333,17 +6331,432 @@
           </a:fontRef>
         </p:style>
         <p:txBody>
-          <a:bodyPr rtlCol="0" anchor="ctr"/>
-          <a:lstStyle/>
-          <a:p>
-            <a:pPr>
-              <a:tabLst>
-                <a:tab pos="6624638" algn="r"/>
-              </a:tabLst>
+          <a:bodyPr rtlCol="0" anchor="t"/>
+          <a:lstStyle/>
+          <a:p>
+            <a:r>
+              <a:rPr lang="en-US" b="1" dirty="0">
+                <a:solidFill>
+                  <a:srgbClr val="062EAB"/>
+                </a:solidFill>
+              </a:rPr>
+              <a:t>Case 1: Juanita Perez</a:t>
+            </a:r>
+          </a:p>
+          <a:p>
+            <a:endParaRPr lang="en-US" b="1" dirty="0">
+              <a:solidFill>
+                <a:srgbClr val="062EAB"/>
+              </a:solidFill>
+            </a:endParaRPr>
+          </a:p>
+          <a:p>
+            <a:r>
+              <a:rPr lang="en-US" b="1" dirty="0">
+                <a:solidFill>
+                  <a:srgbClr val="062EAB"/>
+                </a:solidFill>
+              </a:rPr>
+              <a:t>Narrative about her.  </a:t>
+            </a:r>
+            <a:endParaRPr lang="en-US" dirty="0">
+              <a:solidFill>
+                <a:srgbClr val="062EAB"/>
+              </a:solidFill>
+            </a:endParaRPr>
+          </a:p>
+          <a:p>
+            <a:endParaRPr lang="en-US" dirty="0">
+              <a:solidFill>
+                <a:srgbClr val="062EAB"/>
+              </a:solidFill>
+            </a:endParaRPr>
+          </a:p>
+        </p:txBody>
+      </p:sp>
+      <p:sp>
+        <p:nvSpPr>
+          <p:cNvPr id="13" name="Rounded Rectangle 12">
+            <a:extLst>
+              <a:ext uri="{FF2B5EF4-FFF2-40B4-BE49-F238E27FC236}">
+                <a16:creationId xmlns:a16="http://schemas.microsoft.com/office/drawing/2014/main" id="{8734ECC5-BB11-7C4A-A1F9-1630A8E35D33}"/>
+              </a:ext>
+            </a:extLst>
+          </p:cNvPr>
+          <p:cNvSpPr/>
+          <p:nvPr/>
+        </p:nvSpPr>
+        <p:spPr>
+          <a:xfrm>
+            <a:off x="2667198" y="8212078"/>
+            <a:ext cx="1884014" cy="1773315"/>
+          </a:xfrm>
+          <a:prstGeom prst="roundRect">
+            <a:avLst/>
+          </a:prstGeom>
+          <a:solidFill>
+            <a:schemeClr val="accent1">
+              <a:lumMod val="20000"/>
+              <a:lumOff val="80000"/>
+            </a:schemeClr>
+          </a:solidFill>
+        </p:spPr>
+        <p:style>
+          <a:lnRef idx="2">
+            <a:schemeClr val="accent1">
+              <a:shade val="50000"/>
+            </a:schemeClr>
+          </a:lnRef>
+          <a:fillRef idx="1">
+            <a:schemeClr val="accent1"/>
+          </a:fillRef>
+          <a:effectRef idx="0">
+            <a:schemeClr val="accent1"/>
+          </a:effectRef>
+          <a:fontRef idx="minor">
+            <a:schemeClr val="lt1"/>
+          </a:fontRef>
+        </p:style>
+        <p:txBody>
+          <a:bodyPr rtlCol="0" anchor="t"/>
+          <a:lstStyle/>
+          <a:p>
+            <a:r>
+              <a:rPr lang="en-US" b="1" dirty="0">
+                <a:solidFill>
+                  <a:srgbClr val="062EAB"/>
+                </a:solidFill>
+              </a:rPr>
+              <a:t>Case 2: Juanita Perez</a:t>
+            </a:r>
+          </a:p>
+          <a:p>
+            <a:endParaRPr lang="en-US" b="1" dirty="0">
+              <a:solidFill>
+                <a:srgbClr val="062EAB"/>
+              </a:solidFill>
+            </a:endParaRPr>
+          </a:p>
+          <a:p>
+            <a:r>
+              <a:rPr lang="en-US" b="1" dirty="0">
+                <a:solidFill>
+                  <a:srgbClr val="062EAB"/>
+                </a:solidFill>
+              </a:rPr>
+              <a:t>Narrative about her.  </a:t>
+            </a:r>
+            <a:endParaRPr lang="en-US" dirty="0">
+              <a:solidFill>
+                <a:srgbClr val="062EAB"/>
+              </a:solidFill>
+            </a:endParaRPr>
+          </a:p>
+          <a:p>
+            <a:endParaRPr lang="en-US" dirty="0">
+              <a:solidFill>
+                <a:srgbClr val="062EAB"/>
+              </a:solidFill>
+            </a:endParaRPr>
+          </a:p>
+        </p:txBody>
+      </p:sp>
+      <p:sp>
+        <p:nvSpPr>
+          <p:cNvPr id="14" name="Rounded Rectangle 13">
+            <a:extLst>
+              <a:ext uri="{FF2B5EF4-FFF2-40B4-BE49-F238E27FC236}">
+                <a16:creationId xmlns:a16="http://schemas.microsoft.com/office/drawing/2014/main" id="{682327B3-C480-EA4C-95AA-DCC034AAF5EC}"/>
+              </a:ext>
+            </a:extLst>
+          </p:cNvPr>
+          <p:cNvSpPr/>
+          <p:nvPr/>
+        </p:nvSpPr>
+        <p:spPr>
+          <a:xfrm>
+            <a:off x="5058742" y="8212077"/>
+            <a:ext cx="1884014" cy="1773315"/>
+          </a:xfrm>
+          <a:prstGeom prst="roundRect">
+            <a:avLst/>
+          </a:prstGeom>
+          <a:solidFill>
+            <a:schemeClr val="accent1">
+              <a:lumMod val="20000"/>
+              <a:lumOff val="80000"/>
+            </a:schemeClr>
+          </a:solidFill>
+        </p:spPr>
+        <p:style>
+          <a:lnRef idx="2">
+            <a:schemeClr val="accent1">
+              <a:shade val="50000"/>
+            </a:schemeClr>
+          </a:lnRef>
+          <a:fillRef idx="1">
+            <a:schemeClr val="accent1"/>
+          </a:fillRef>
+          <a:effectRef idx="0">
+            <a:schemeClr val="accent1"/>
+          </a:effectRef>
+          <a:fontRef idx="minor">
+            <a:schemeClr val="lt1"/>
+          </a:fontRef>
+        </p:style>
+        <p:txBody>
+          <a:bodyPr rtlCol="0" anchor="t"/>
+          <a:lstStyle/>
+          <a:p>
+            <a:r>
+              <a:rPr lang="en-US" b="1" dirty="0">
+                <a:solidFill>
+                  <a:srgbClr val="062EAB"/>
+                </a:solidFill>
+              </a:rPr>
+              <a:t>Case 3: Juanita Perez</a:t>
+            </a:r>
+          </a:p>
+          <a:p>
+            <a:endParaRPr lang="en-US" b="1" dirty="0">
+              <a:solidFill>
+                <a:srgbClr val="062EAB"/>
+              </a:solidFill>
+            </a:endParaRPr>
+          </a:p>
+          <a:p>
+            <a:r>
+              <a:rPr lang="en-US" b="1" dirty="0">
+                <a:solidFill>
+                  <a:srgbClr val="062EAB"/>
+                </a:solidFill>
+              </a:rPr>
+              <a:t>Narrative about her.  </a:t>
+            </a:r>
+            <a:endParaRPr lang="en-US" dirty="0">
+              <a:solidFill>
+                <a:srgbClr val="062EAB"/>
+              </a:solidFill>
+            </a:endParaRPr>
+          </a:p>
+          <a:p>
+            <a:endParaRPr lang="en-US" dirty="0">
+              <a:solidFill>
+                <a:srgbClr val="062EAB"/>
+              </a:solidFill>
+            </a:endParaRPr>
+          </a:p>
+        </p:txBody>
+      </p:sp>
+      <p:sp>
+        <p:nvSpPr>
+          <p:cNvPr id="15" name="Rounded Rectangle 14">
+            <a:extLst>
+              <a:ext uri="{FF2B5EF4-FFF2-40B4-BE49-F238E27FC236}">
+                <a16:creationId xmlns:a16="http://schemas.microsoft.com/office/drawing/2014/main" id="{2F87159A-2485-474A-AC4E-13A9D196BE79}"/>
+              </a:ext>
+            </a:extLst>
+          </p:cNvPr>
+          <p:cNvSpPr/>
+          <p:nvPr/>
+        </p:nvSpPr>
+        <p:spPr>
+          <a:xfrm>
+            <a:off x="204537" y="10127508"/>
+            <a:ext cx="6521115" cy="1921891"/>
+          </a:xfrm>
+          <a:prstGeom prst="roundRect">
+            <a:avLst/>
+          </a:prstGeom>
+          <a:solidFill>
+            <a:schemeClr val="accent1">
+              <a:lumMod val="20000"/>
+              <a:lumOff val="80000"/>
+            </a:schemeClr>
+          </a:solidFill>
+        </p:spPr>
+        <p:style>
+          <a:lnRef idx="2">
+            <a:schemeClr val="accent1">
+              <a:shade val="50000"/>
+            </a:schemeClr>
+          </a:lnRef>
+          <a:fillRef idx="1">
+            <a:schemeClr val="accent1"/>
+          </a:fillRef>
+          <a:effectRef idx="0">
+            <a:schemeClr val="accent1"/>
+          </a:effectRef>
+          <a:fontRef idx="minor">
+            <a:schemeClr val="lt1"/>
+          </a:fontRef>
+        </p:style>
+        <p:txBody>
+          <a:bodyPr rtlCol="0" anchor="t"/>
+          <a:lstStyle/>
+          <a:p>
+            <a:r>
+              <a:rPr lang="en-US" b="1" dirty="0">
+                <a:solidFill>
+                  <a:srgbClr val="062EAB"/>
+                </a:solidFill>
+              </a:rPr>
+              <a:t>Example Reports: </a:t>
+            </a:r>
+            <a:endParaRPr lang="en-US" dirty="0">
+              <a:solidFill>
+                <a:srgbClr val="062EAB"/>
+              </a:solidFill>
+            </a:endParaRPr>
+          </a:p>
+          <a:p>
+            <a:endParaRPr lang="en-US" dirty="0">
+              <a:solidFill>
+                <a:srgbClr val="062EAB"/>
+              </a:solidFill>
+            </a:endParaRPr>
+          </a:p>
+        </p:txBody>
+      </p:sp>
+      <p:sp>
+        <p:nvSpPr>
+          <p:cNvPr id="18" name="Rectangle 17">
+            <a:extLst>
+              <a:ext uri="{FF2B5EF4-FFF2-40B4-BE49-F238E27FC236}">
+                <a16:creationId xmlns:a16="http://schemas.microsoft.com/office/drawing/2014/main" id="{532F9CDB-6900-4B4B-82A5-320D0012C26A}"/>
+              </a:ext>
+            </a:extLst>
+          </p:cNvPr>
+          <p:cNvSpPr/>
+          <p:nvPr/>
+        </p:nvSpPr>
+        <p:spPr>
+          <a:xfrm>
+            <a:off x="634144" y="10520764"/>
+            <a:ext cx="3429000" cy="1200329"/>
+          </a:xfrm>
+          <a:prstGeom prst="rect">
+            <a:avLst/>
+          </a:prstGeom>
+        </p:spPr>
+        <p:txBody>
+          <a:bodyPr>
+            <a:spAutoFit/>
+          </a:bodyPr>
+          <a:lstStyle/>
+          <a:p>
+            <a:pPr fontAlgn="base">
+              <a:buFont typeface="+mj-lt"/>
+              <a:buAutoNum type="arabicPeriod"/>
             </a:pPr>
             <a:r>
-              <a:rPr lang="en-US" sz="1400" dirty="0"/>
-              <a:t>Copyright 2021	</a:t>
+              <a:rPr lang="en-US" dirty="0">
+                <a:solidFill>
+                  <a:srgbClr val="595959"/>
+                </a:solidFill>
+                <a:latin typeface="Arial" panose="020B0604020202020204" pitchFamily="34" charset="0"/>
+              </a:rPr>
+              <a:t> Top X risks</a:t>
+            </a:r>
+          </a:p>
+          <a:p>
+            <a:pPr fontAlgn="base"/>
+            <a:r>
+              <a:rPr lang="en-US" dirty="0">
+                <a:solidFill>
+                  <a:srgbClr val="595959"/>
+                </a:solidFill>
+                <a:latin typeface="Arial" panose="020B0604020202020204" pitchFamily="34" charset="0"/>
+              </a:rPr>
+              <a:t>(enter the number you want and it runs the query) </a:t>
+            </a:r>
+          </a:p>
+          <a:p>
+            <a:pPr fontAlgn="base"/>
+            <a:endParaRPr lang="en-US" dirty="0"/>
+          </a:p>
+        </p:txBody>
+      </p:sp>
+      <p:sp>
+        <p:nvSpPr>
+          <p:cNvPr id="20" name="Rectangle 19">
+            <a:extLst>
+              <a:ext uri="{FF2B5EF4-FFF2-40B4-BE49-F238E27FC236}">
+                <a16:creationId xmlns:a16="http://schemas.microsoft.com/office/drawing/2014/main" id="{06973FCF-389E-4249-A9B9-A906739138BB}"/>
+              </a:ext>
+            </a:extLst>
+          </p:cNvPr>
+          <p:cNvSpPr/>
+          <p:nvPr/>
+        </p:nvSpPr>
+        <p:spPr>
+          <a:xfrm>
+            <a:off x="4063143" y="10245181"/>
+            <a:ext cx="3092115" cy="646331"/>
+          </a:xfrm>
+          <a:prstGeom prst="rect">
+            <a:avLst/>
+          </a:prstGeom>
+        </p:spPr>
+        <p:txBody>
+          <a:bodyPr wrap="square">
+            <a:spAutoFit/>
+          </a:bodyPr>
+          <a:lstStyle/>
+          <a:p>
+            <a:br>
+              <a:rPr lang="en-US" dirty="0"/>
+            </a:br>
+            <a:r>
+              <a:rPr lang="en-US" dirty="0">
+                <a:solidFill>
+                  <a:srgbClr val="595959"/>
+                </a:solidFill>
+                <a:latin typeface="Arial" panose="020B0604020202020204" pitchFamily="34" charset="0"/>
+              </a:rPr>
+              <a:t>2.  </a:t>
+            </a:r>
+            <a:endParaRPr lang="en-US" dirty="0"/>
+          </a:p>
+        </p:txBody>
+      </p:sp>
+      <p:sp>
+        <p:nvSpPr>
+          <p:cNvPr id="8" name="TextBox 7">
+            <a:extLst>
+              <a:ext uri="{FF2B5EF4-FFF2-40B4-BE49-F238E27FC236}">
+                <a16:creationId xmlns:a16="http://schemas.microsoft.com/office/drawing/2014/main" id="{6F1714FC-8B49-E740-8D6A-A40034212709}"/>
+              </a:ext>
+            </a:extLst>
+          </p:cNvPr>
+          <p:cNvSpPr txBox="1"/>
+          <p:nvPr/>
+        </p:nvSpPr>
+        <p:spPr>
+          <a:xfrm>
+            <a:off x="4423196" y="5039906"/>
+            <a:ext cx="980908" cy="369332"/>
+          </a:xfrm>
+          <a:prstGeom prst="rect">
+            <a:avLst/>
+          </a:prstGeom>
+          <a:solidFill>
+            <a:schemeClr val="tx2"/>
+          </a:solidFill>
+        </p:spPr>
+        <p:txBody>
+          <a:bodyPr wrap="square" rtlCol="0">
+            <a:spAutoFit/>
+          </a:bodyPr>
+          <a:lstStyle/>
+          <a:p>
+            <a:r>
+              <a:rPr lang="en-US" dirty="0">
+                <a:solidFill>
+                  <a:schemeClr val="bg1"/>
+                </a:solidFill>
+              </a:rPr>
+              <a:t>Submit</a:t>
             </a:r>
           </a:p>
         </p:txBody>

</xml_diff>